<commit_message>
adjusted readme, seperated example and test cases, added more test cases
</commit_message>
<xml_diff>
--- a/snippets/migrate-third-party-to-camunda/docs/doku.pptx
+++ b/snippets/migrate-third-party-to-camunda/docs/doku.pptx
@@ -5,10 +5,10 @@
     <p:sldMasterId id="2147483648" r:id="rId1"/>
   </p:sldMasterIdLst>
   <p:notesMasterIdLst>
-    <p:notesMasterId r:id="rId7"/>
+    <p:notesMasterId r:id="rId8"/>
   </p:notesMasterIdLst>
   <p:handoutMasterIdLst>
-    <p:handoutMasterId r:id="rId8"/>
+    <p:handoutMasterId r:id="rId9"/>
   </p:handoutMasterIdLst>
   <p:sldIdLst>
     <p:sldId id="256" r:id="rId2"/>
@@ -16,11 +16,12 @@
     <p:sldId id="289" r:id="rId4"/>
     <p:sldId id="287" r:id="rId5"/>
     <p:sldId id="288" r:id="rId6"/>
+    <p:sldId id="291" r:id="rId7"/>
   </p:sldIdLst>
   <p:sldSz cx="9144000" cy="6858000" type="screen4x3"/>
   <p:notesSz cx="6858000" cy="9144000"/>
   <p:custDataLst>
-    <p:tags r:id="rId9"/>
+    <p:tags r:id="rId10"/>
   </p:custDataLst>
   <p:defaultTextStyle>
     <a:defPPr>
@@ -283,7 +284,7 @@
             <a:fld id="{80F06307-6088-4DFD-BB97-31C1E3C8F94D}" type="datetimeFigureOut">
               <a:rPr lang="en-US" smtClean="0"/>
               <a:pPr/>
-              <a:t>7/29/2014</a:t>
+              <a:t>7/30/2014</a:t>
             </a:fld>
             <a:endParaRPr lang="de-DE"/>
           </a:p>
@@ -454,7 +455,7 @@
             <a:fld id="{56E7BBA9-3E9F-478E-BBF6-AD90C451F165}" type="datetimeFigureOut">
               <a:rPr lang="en-GB" smtClean="0"/>
               <a:pPr/>
-              <a:t>29/07/2014</a:t>
+              <a:t>30/07/2014</a:t>
             </a:fld>
             <a:endParaRPr lang="en-GB"/>
           </a:p>
@@ -1089,7 +1090,7 @@
           <a:graphicData uri="http://schemas.openxmlformats.org/presentationml/2006/ole">
             <mc:AlternateContent xmlns:mc="http://schemas.openxmlformats.org/markup-compatibility/2006">
               <mc:Choice xmlns:v="urn:schemas-microsoft-com:vml" Requires="v">
-                <p:oleObj spid="_x0000_s1033" name="think-cell Slide" r:id="rId8" imgW="0" imgH="0" progId="TCLayout.ActiveDocument.1">
+                <p:oleObj spid="_x0000_s1034" name="think-cell Slide" r:id="rId8" imgW="0" imgH="0" progId="TCLayout.ActiveDocument.1">
                   <p:embed/>
                 </p:oleObj>
               </mc:Choice>
@@ -1354,7 +1355,7 @@
           <a:graphicData uri="http://schemas.openxmlformats.org/presentationml/2006/ole">
             <mc:AlternateContent xmlns:mc="http://schemas.openxmlformats.org/markup-compatibility/2006">
               <mc:Choice xmlns:v="urn:schemas-microsoft-com:vml" Requires="v">
-                <p:oleObj spid="_x0000_s8200" name="think-cell Slide" r:id="rId5" imgW="0" imgH="0" progId="TCLayout.ActiveDocument.1">
+                <p:oleObj spid="_x0000_s8201" name="think-cell Slide" r:id="rId5" imgW="0" imgH="0" progId="TCLayout.ActiveDocument.1">
                   <p:embed/>
                 </p:oleObj>
               </mc:Choice>
@@ -1664,7 +1665,7 @@
           <a:graphicData uri="http://schemas.openxmlformats.org/presentationml/2006/ole">
             <mc:AlternateContent xmlns:mc="http://schemas.openxmlformats.org/markup-compatibility/2006">
               <mc:Choice xmlns:v="urn:schemas-microsoft-com:vml" Requires="v">
-                <p:oleObj spid="_x0000_s136201" name="think-cell Slide" r:id="rId6" imgW="0" imgH="0" progId="TCLayout.ActiveDocument.1">
+                <p:oleObj spid="_x0000_s136202" name="think-cell Slide" r:id="rId6" imgW="0" imgH="0" progId="TCLayout.ActiveDocument.1">
                   <p:embed/>
                 </p:oleObj>
               </mc:Choice>
@@ -2011,7 +2012,7 @@
           <a:graphicData uri="http://schemas.openxmlformats.org/presentationml/2006/ole">
             <mc:AlternateContent xmlns:mc="http://schemas.openxmlformats.org/markup-compatibility/2006">
               <mc:Choice xmlns:v="urn:schemas-microsoft-com:vml" Requires="v">
-                <p:oleObj spid="_x0000_s108553" name="think-cell Slide" r:id="rId4" imgW="0" imgH="0" progId="TCLayout.ActiveDocument.1">
+                <p:oleObj spid="_x0000_s108554" name="think-cell Slide" r:id="rId4" imgW="0" imgH="0" progId="TCLayout.ActiveDocument.1">
                   <p:embed/>
                 </p:oleObj>
               </mc:Choice>
@@ -2214,7 +2215,7 @@
           <a:graphicData uri="http://schemas.openxmlformats.org/presentationml/2006/ole">
             <mc:AlternateContent xmlns:mc="http://schemas.openxmlformats.org/markup-compatibility/2006">
               <mc:Choice xmlns:v="urn:schemas-microsoft-com:vml" Requires="v">
-                <p:oleObj spid="_x0000_s114697" name="think-cell Slide" r:id="rId4" imgW="0" imgH="0" progId="TCLayout.ActiveDocument.1">
+                <p:oleObj spid="_x0000_s114698" name="think-cell Slide" r:id="rId4" imgW="0" imgH="0" progId="TCLayout.ActiveDocument.1">
                   <p:embed/>
                 </p:oleObj>
               </mc:Choice>
@@ -2417,7 +2418,7 @@
           <a:graphicData uri="http://schemas.openxmlformats.org/presentationml/2006/ole">
             <mc:AlternateContent xmlns:mc="http://schemas.openxmlformats.org/markup-compatibility/2006">
               <mc:Choice xmlns:v="urn:schemas-microsoft-com:vml" Requires="v">
-                <p:oleObj spid="_x0000_s107529" name="think-cell Slide" r:id="rId4" imgW="0" imgH="0" progId="TCLayout.ActiveDocument.1">
+                <p:oleObj spid="_x0000_s107530" name="think-cell Slide" r:id="rId4" imgW="0" imgH="0" progId="TCLayout.ActiveDocument.1">
                   <p:embed/>
                 </p:oleObj>
               </mc:Choice>
@@ -2538,7 +2539,7 @@
           <a:graphicData uri="http://schemas.openxmlformats.org/presentationml/2006/ole">
             <mc:AlternateContent xmlns:mc="http://schemas.openxmlformats.org/markup-compatibility/2006">
               <mc:Choice xmlns:v="urn:schemas-microsoft-com:vml" Requires="v">
-                <p:oleObj spid="_x0000_s115721" name="think-cell Slide" r:id="rId4" imgW="0" imgH="0" progId="TCLayout.ActiveDocument.1">
+                <p:oleObj spid="_x0000_s115722" name="think-cell Slide" r:id="rId4" imgW="0" imgH="0" progId="TCLayout.ActiveDocument.1">
                   <p:embed/>
                 </p:oleObj>
               </mc:Choice>
@@ -2749,7 +2750,7 @@
           <a:graphicData uri="http://schemas.openxmlformats.org/presentationml/2006/ole">
             <mc:AlternateContent xmlns:mc="http://schemas.openxmlformats.org/markup-compatibility/2006">
               <mc:Choice xmlns:v="urn:schemas-microsoft-com:vml" Requires="v">
-                <p:oleObj spid="_x0000_s137225" name="think-cell Slide" r:id="rId4" imgW="0" imgH="0" progId="TCLayout.ActiveDocument.1">
+                <p:oleObj spid="_x0000_s137226" name="think-cell Slide" r:id="rId4" imgW="0" imgH="0" progId="TCLayout.ActiveDocument.1">
                   <p:embed/>
                 </p:oleObj>
               </mc:Choice>
@@ -2909,7 +2910,7 @@
           <a:graphicData uri="http://schemas.openxmlformats.org/presentationml/2006/ole">
             <mc:AlternateContent xmlns:mc="http://schemas.openxmlformats.org/markup-compatibility/2006">
               <mc:Choice xmlns:v="urn:schemas-microsoft-com:vml" Requires="v">
-                <p:oleObj spid="_x0000_s116745" name="think-cell Slide" r:id="rId18" imgW="0" imgH="0" progId="TCLayout.ActiveDocument.1">
+                <p:oleObj spid="_x0000_s116746" name="think-cell Slide" r:id="rId18" imgW="0" imgH="0" progId="TCLayout.ActiveDocument.1">
                   <p:embed/>
                 </p:oleObj>
               </mc:Choice>
@@ -4078,7 +4079,7 @@
           <a:graphicData uri="http://schemas.openxmlformats.org/presentationml/2006/ole">
             <mc:AlternateContent xmlns:mc="http://schemas.openxmlformats.org/markup-compatibility/2006">
               <mc:Choice xmlns:v="urn:schemas-microsoft-com:vml" Requires="v">
-                <p:oleObj spid="_x0000_s2056" name="think-cell Slide" r:id="rId16" imgW="0" imgH="0" progId="TCLayout.ActiveDocument.1">
+                <p:oleObj spid="_x0000_s2057" name="think-cell Slide" r:id="rId16" imgW="0" imgH="0" progId="TCLayout.ActiveDocument.1">
                   <p:embed/>
                 </p:oleObj>
               </mc:Choice>
@@ -4457,7 +4458,7 @@
           <a:graphicData uri="http://schemas.openxmlformats.org/presentationml/2006/ole">
             <mc:AlternateContent xmlns:mc="http://schemas.openxmlformats.org/markup-compatibility/2006">
               <mc:Choice xmlns:v="urn:schemas-microsoft-com:vml" Requires="v">
-                <p:oleObj spid="_x0000_s18440" name="think-cell Slide" r:id="rId5" imgW="0" imgH="0" progId="TCLayout.ActiveDocument.1">
+                <p:oleObj spid="_x0000_s18441" name="think-cell Slide" r:id="rId5" imgW="0" imgH="0" progId="TCLayout.ActiveDocument.1">
                   <p:embed/>
                 </p:oleObj>
               </mc:Choice>
@@ -9091,6 +9092,442 @@
     <p:extLst>
       <p:ext uri="{BB962C8B-B14F-4D97-AF65-F5344CB8AC3E}">
         <p14:creationId xmlns:p14="http://schemas.microsoft.com/office/powerpoint/2010/main" val="3103635893"/>
+      </p:ext>
+    </p:extLst>
+  </p:cSld>
+  <p:clrMapOvr>
+    <a:masterClrMapping/>
+  </p:clrMapOvr>
+  <p:transition/>
+  <p:timing>
+    <p:tnLst>
+      <p:par>
+        <p:cTn id="1" dur="indefinite" restart="never" nodeType="tmRoot"/>
+      </p:par>
+    </p:tnLst>
+  </p:timing>
+</p:sld>
+</file>
+
+<file path=ppt/slides/slide6.xml><?xml version="1.0" encoding="utf-8"?>
+<p:sld xmlns:a="http://schemas.openxmlformats.org/drawingml/2006/main" xmlns:r="http://schemas.openxmlformats.org/officeDocument/2006/relationships" xmlns:p="http://schemas.openxmlformats.org/presentationml/2006/main">
+  <p:cSld>
+    <p:spTree>
+      <p:nvGrpSpPr>
+        <p:cNvPr id="1" name=""/>
+        <p:cNvGrpSpPr/>
+        <p:nvPr/>
+      </p:nvGrpSpPr>
+      <p:grpSpPr>
+        <a:xfrm>
+          <a:off x="0" y="0"/>
+          <a:ext cx="0" cy="0"/>
+          <a:chOff x="0" y="0"/>
+          <a:chExt cx="0" cy="0"/>
+        </a:xfrm>
+      </p:grpSpPr>
+      <p:sp>
+        <p:nvSpPr>
+          <p:cNvPr id="2" name="Textplatzhalter 1"/>
+          <p:cNvSpPr>
+            <a:spLocks noGrp="1"/>
+          </p:cNvSpPr>
+          <p:nvPr>
+            <p:ph type="body" sz="quarter" idx="10"/>
+          </p:nvPr>
+        </p:nvSpPr>
+        <p:spPr/>
+        <p:txBody>
+          <a:bodyPr/>
+          <a:lstStyle/>
+          <a:p>
+            <a:endParaRPr lang="de-DE"/>
+          </a:p>
+        </p:txBody>
+      </p:sp>
+      <p:pic>
+        <p:nvPicPr>
+          <p:cNvPr id="3" name="Grafik 2"/>
+          <p:cNvPicPr>
+            <a:picLocks noChangeAspect="1"/>
+          </p:cNvPicPr>
+          <p:nvPr/>
+        </p:nvPicPr>
+        <p:blipFill>
+          <a:blip r:embed="rId2"/>
+          <a:stretch>
+            <a:fillRect/>
+          </a:stretch>
+        </p:blipFill>
+        <p:spPr>
+          <a:xfrm>
+            <a:off x="3491880" y="333461"/>
+            <a:ext cx="5520133" cy="2224328"/>
+          </a:xfrm>
+          <a:prstGeom prst="rect">
+            <a:avLst/>
+          </a:prstGeom>
+        </p:spPr>
+      </p:pic>
+      <p:pic>
+        <p:nvPicPr>
+          <p:cNvPr id="4" name="Grafik 3"/>
+          <p:cNvPicPr>
+            <a:picLocks noChangeAspect="1"/>
+          </p:cNvPicPr>
+          <p:nvPr/>
+        </p:nvPicPr>
+        <p:blipFill>
+          <a:blip r:embed="rId3"/>
+          <a:stretch>
+            <a:fillRect/>
+          </a:stretch>
+        </p:blipFill>
+        <p:spPr>
+          <a:xfrm>
+            <a:off x="3485693" y="2996952"/>
+            <a:ext cx="5541017" cy="3168085"/>
+          </a:xfrm>
+          <a:prstGeom prst="rect">
+            <a:avLst/>
+          </a:prstGeom>
+        </p:spPr>
+      </p:pic>
+      <p:sp>
+        <p:nvSpPr>
+          <p:cNvPr id="5" name="Rechteck 4"/>
+          <p:cNvSpPr/>
+          <p:nvPr/>
+        </p:nvSpPr>
+        <p:spPr bwMode="auto">
+          <a:xfrm>
+            <a:off x="3841145" y="5373216"/>
+            <a:ext cx="4608512" cy="576064"/>
+          </a:xfrm>
+          <a:prstGeom prst="rect">
+            <a:avLst/>
+          </a:prstGeom>
+          <a:solidFill>
+            <a:schemeClr val="accent1">
+              <a:alpha val="23000"/>
+            </a:schemeClr>
+          </a:solidFill>
+          <a:ln w="9525" cap="flat" cmpd="sng" algn="ctr">
+            <a:noFill/>
+            <a:prstDash val="solid"/>
+            <a:round/>
+            <a:headEnd type="none" w="med" len="med"/>
+            <a:tailEnd type="none" w="med" len="med"/>
+          </a:ln>
+          <a:effectLst/>
+        </p:spPr>
+        <p:txBody>
+          <a:bodyPr vert="horz" wrap="square" lIns="72000" tIns="46800" rIns="72000" bIns="46800" numCol="1" rtlCol="0" anchor="ctr" anchorCtr="0" compatLnSpc="1">
+            <a:prstTxWarp prst="textNoShape">
+              <a:avLst/>
+            </a:prstTxWarp>
+          </a:bodyPr>
+          <a:lstStyle/>
+          <a:p>
+            <a:pPr marL="0" marR="0" indent="0" algn="l" defTabSz="914400" rtl="0" eaLnBrk="1" fontAlgn="base" latinLnBrk="0" hangingPunct="1">
+              <a:lnSpc>
+                <a:spcPct val="90000"/>
+              </a:lnSpc>
+              <a:spcBef>
+                <a:spcPct val="0"/>
+              </a:spcBef>
+              <a:spcAft>
+                <a:spcPct val="0"/>
+              </a:spcAft>
+              <a:buClrTx/>
+              <a:buSzTx/>
+              <a:buFontTx/>
+              <a:buNone/>
+              <a:tabLst/>
+            </a:pPr>
+            <a:endParaRPr kumimoji="0" lang="de-DE" sz="1400" b="0" i="0" u="none" strike="noStrike" cap="none" normalizeH="0" baseline="0" dirty="0" err="1" smtClean="0">
+              <a:ln>
+                <a:noFill/>
+              </a:ln>
+              <a:solidFill>
+                <a:schemeClr val="tx1"/>
+              </a:solidFill>
+              <a:effectLst/>
+              <a:latin typeface="+mn-lt"/>
+            </a:endParaRPr>
+          </a:p>
+        </p:txBody>
+      </p:sp>
+      <p:sp>
+        <p:nvSpPr>
+          <p:cNvPr id="6" name="Rechteck 5"/>
+          <p:cNvSpPr/>
+          <p:nvPr/>
+        </p:nvSpPr>
+        <p:spPr bwMode="auto">
+          <a:xfrm>
+            <a:off x="8017609" y="4509120"/>
+            <a:ext cx="432048" cy="864096"/>
+          </a:xfrm>
+          <a:prstGeom prst="rect">
+            <a:avLst/>
+          </a:prstGeom>
+          <a:solidFill>
+            <a:schemeClr val="accent1">
+              <a:alpha val="23000"/>
+            </a:schemeClr>
+          </a:solidFill>
+          <a:ln w="9525" cap="flat" cmpd="sng" algn="ctr">
+            <a:noFill/>
+            <a:prstDash val="solid"/>
+            <a:round/>
+            <a:headEnd type="none" w="med" len="med"/>
+            <a:tailEnd type="none" w="med" len="med"/>
+          </a:ln>
+          <a:effectLst/>
+        </p:spPr>
+        <p:txBody>
+          <a:bodyPr vert="horz" wrap="square" lIns="72000" tIns="46800" rIns="72000" bIns="46800" numCol="1" rtlCol="0" anchor="ctr" anchorCtr="0" compatLnSpc="1">
+            <a:prstTxWarp prst="textNoShape">
+              <a:avLst/>
+            </a:prstTxWarp>
+          </a:bodyPr>
+          <a:lstStyle/>
+          <a:p>
+            <a:pPr marL="0" marR="0" indent="0" algn="l" defTabSz="914400" rtl="0" eaLnBrk="1" fontAlgn="base" latinLnBrk="0" hangingPunct="1">
+              <a:lnSpc>
+                <a:spcPct val="90000"/>
+              </a:lnSpc>
+              <a:spcBef>
+                <a:spcPct val="0"/>
+              </a:spcBef>
+              <a:spcAft>
+                <a:spcPct val="0"/>
+              </a:spcAft>
+              <a:buClrTx/>
+              <a:buSzTx/>
+              <a:buFontTx/>
+              <a:buNone/>
+              <a:tabLst/>
+            </a:pPr>
+            <a:endParaRPr kumimoji="0" lang="de-DE" sz="1400" b="0" i="0" u="none" strike="noStrike" cap="none" normalizeH="0" baseline="0" dirty="0" err="1" smtClean="0">
+              <a:ln>
+                <a:noFill/>
+              </a:ln>
+              <a:solidFill>
+                <a:schemeClr val="tx1"/>
+              </a:solidFill>
+              <a:effectLst/>
+              <a:latin typeface="+mn-lt"/>
+            </a:endParaRPr>
+          </a:p>
+        </p:txBody>
+      </p:sp>
+      <p:sp>
+        <p:nvSpPr>
+          <p:cNvPr id="7" name="Rechteck 6"/>
+          <p:cNvSpPr/>
+          <p:nvPr/>
+        </p:nvSpPr>
+        <p:spPr bwMode="auto">
+          <a:xfrm>
+            <a:off x="4654005" y="4077072"/>
+            <a:ext cx="699308" cy="1296144"/>
+          </a:xfrm>
+          <a:prstGeom prst="rect">
+            <a:avLst/>
+          </a:prstGeom>
+          <a:solidFill>
+            <a:schemeClr val="accent1">
+              <a:alpha val="23000"/>
+            </a:schemeClr>
+          </a:solidFill>
+          <a:ln w="9525" cap="flat" cmpd="sng" algn="ctr">
+            <a:noFill/>
+            <a:prstDash val="solid"/>
+            <a:round/>
+            <a:headEnd type="none" w="med" len="med"/>
+            <a:tailEnd type="none" w="med" len="med"/>
+          </a:ln>
+          <a:effectLst/>
+        </p:spPr>
+        <p:txBody>
+          <a:bodyPr vert="horz" wrap="square" lIns="72000" tIns="46800" rIns="72000" bIns="46800" numCol="1" rtlCol="0" anchor="ctr" anchorCtr="0" compatLnSpc="1">
+            <a:prstTxWarp prst="textNoShape">
+              <a:avLst/>
+            </a:prstTxWarp>
+          </a:bodyPr>
+          <a:lstStyle/>
+          <a:p>
+            <a:pPr marL="0" marR="0" indent="0" algn="l" defTabSz="914400" rtl="0" eaLnBrk="1" fontAlgn="base" latinLnBrk="0" hangingPunct="1">
+              <a:lnSpc>
+                <a:spcPct val="90000"/>
+              </a:lnSpc>
+              <a:spcBef>
+                <a:spcPct val="0"/>
+              </a:spcBef>
+              <a:spcAft>
+                <a:spcPct val="0"/>
+              </a:spcAft>
+              <a:buClrTx/>
+              <a:buSzTx/>
+              <a:buFontTx/>
+              <a:buNone/>
+              <a:tabLst/>
+            </a:pPr>
+            <a:endParaRPr kumimoji="0" lang="de-DE" sz="1400" b="0" i="0" u="none" strike="noStrike" cap="none" normalizeH="0" baseline="0" dirty="0" err="1" smtClean="0">
+              <a:ln>
+                <a:noFill/>
+              </a:ln>
+              <a:solidFill>
+                <a:schemeClr val="tx1"/>
+              </a:solidFill>
+              <a:effectLst/>
+              <a:latin typeface="+mn-lt"/>
+            </a:endParaRPr>
+          </a:p>
+        </p:txBody>
+      </p:sp>
+      <p:sp>
+        <p:nvSpPr>
+          <p:cNvPr id="8" name="Rechteck 7"/>
+          <p:cNvSpPr/>
+          <p:nvPr/>
+        </p:nvSpPr>
+        <p:spPr bwMode="auto">
+          <a:xfrm>
+            <a:off x="5275070" y="3356992"/>
+            <a:ext cx="510291" cy="720080"/>
+          </a:xfrm>
+          <a:prstGeom prst="rect">
+            <a:avLst/>
+          </a:prstGeom>
+          <a:solidFill>
+            <a:schemeClr val="accent1">
+              <a:alpha val="23000"/>
+            </a:schemeClr>
+          </a:solidFill>
+          <a:ln w="9525" cap="flat" cmpd="sng" algn="ctr">
+            <a:noFill/>
+            <a:prstDash val="solid"/>
+            <a:round/>
+            <a:headEnd type="none" w="med" len="med"/>
+            <a:tailEnd type="none" w="med" len="med"/>
+          </a:ln>
+          <a:effectLst/>
+        </p:spPr>
+        <p:txBody>
+          <a:bodyPr vert="horz" wrap="square" lIns="72000" tIns="46800" rIns="72000" bIns="46800" numCol="1" rtlCol="0" anchor="ctr" anchorCtr="0" compatLnSpc="1">
+            <a:prstTxWarp prst="textNoShape">
+              <a:avLst/>
+            </a:prstTxWarp>
+          </a:bodyPr>
+          <a:lstStyle/>
+          <a:p>
+            <a:pPr marL="0" marR="0" indent="0" algn="l" defTabSz="914400" rtl="0" eaLnBrk="1" fontAlgn="base" latinLnBrk="0" hangingPunct="1">
+              <a:lnSpc>
+                <a:spcPct val="90000"/>
+              </a:lnSpc>
+              <a:spcBef>
+                <a:spcPct val="0"/>
+              </a:spcBef>
+              <a:spcAft>
+                <a:spcPct val="0"/>
+              </a:spcAft>
+              <a:buClrTx/>
+              <a:buSzTx/>
+              <a:buFontTx/>
+              <a:buNone/>
+              <a:tabLst/>
+            </a:pPr>
+            <a:endParaRPr kumimoji="0" lang="de-DE" sz="1400" b="0" i="0" u="none" strike="noStrike" cap="none" normalizeH="0" baseline="0" dirty="0" err="1" smtClean="0">
+              <a:ln>
+                <a:noFill/>
+              </a:ln>
+              <a:solidFill>
+                <a:schemeClr val="tx1"/>
+              </a:solidFill>
+              <a:effectLst/>
+              <a:latin typeface="+mn-lt"/>
+            </a:endParaRPr>
+          </a:p>
+        </p:txBody>
+      </p:sp>
+      <p:sp>
+        <p:nvSpPr>
+          <p:cNvPr id="9" name="Pfeil nach unten 8"/>
+          <p:cNvSpPr/>
+          <p:nvPr/>
+        </p:nvSpPr>
+        <p:spPr bwMode="auto">
+          <a:xfrm>
+            <a:off x="6084168" y="2636912"/>
+            <a:ext cx="288032" cy="288032"/>
+          </a:xfrm>
+          <a:prstGeom prst="downArrow">
+            <a:avLst/>
+          </a:prstGeom>
+          <a:ln>
+            <a:noFill/>
+            <a:headEnd type="none" w="med" len="med"/>
+            <a:tailEnd type="none" w="med" len="med"/>
+          </a:ln>
+        </p:spPr>
+        <p:style>
+          <a:lnRef idx="1">
+            <a:schemeClr val="accent1"/>
+          </a:lnRef>
+          <a:fillRef idx="2">
+            <a:schemeClr val="accent1"/>
+          </a:fillRef>
+          <a:effectRef idx="1">
+            <a:schemeClr val="accent1"/>
+          </a:effectRef>
+          <a:fontRef idx="minor">
+            <a:schemeClr val="dk1"/>
+          </a:fontRef>
+        </p:style>
+        <p:txBody>
+          <a:bodyPr vert="horz" wrap="square" lIns="72000" tIns="46800" rIns="72000" bIns="46800" numCol="1" rtlCol="0" anchor="ctr" anchorCtr="0" compatLnSpc="1">
+            <a:prstTxWarp prst="textNoShape">
+              <a:avLst/>
+            </a:prstTxWarp>
+          </a:bodyPr>
+          <a:lstStyle/>
+          <a:p>
+            <a:pPr marL="0" marR="0" indent="0" algn="l" defTabSz="914400" rtl="0" eaLnBrk="1" fontAlgn="base" latinLnBrk="0" hangingPunct="1">
+              <a:lnSpc>
+                <a:spcPct val="90000"/>
+              </a:lnSpc>
+              <a:spcBef>
+                <a:spcPct val="0"/>
+              </a:spcBef>
+              <a:spcAft>
+                <a:spcPct val="0"/>
+              </a:spcAft>
+              <a:buClrTx/>
+              <a:buSzTx/>
+              <a:buFontTx/>
+              <a:buNone/>
+              <a:tabLst/>
+            </a:pPr>
+            <a:endParaRPr kumimoji="0" lang="de-DE" sz="1400" b="0" i="0" u="none" strike="noStrike" cap="none" normalizeH="0" baseline="0" dirty="0" err="1" smtClean="0">
+              <a:ln>
+                <a:noFill/>
+              </a:ln>
+              <a:solidFill>
+                <a:schemeClr val="tx1"/>
+              </a:solidFill>
+              <a:effectLst/>
+              <a:latin typeface="+mn-lt"/>
+            </a:endParaRPr>
+          </a:p>
+        </p:txBody>
+      </p:sp>
+    </p:spTree>
+    <p:extLst>
+      <p:ext uri="{BB962C8B-B14F-4D97-AF65-F5344CB8AC3E}">
+        <p14:creationId xmlns:p14="http://schemas.microsoft.com/office/powerpoint/2010/main" val="3143721590"/>
       </p:ext>
     </p:extLst>
   </p:cSld>

</xml_diff>

<commit_message>
improved readme, changed convention
</commit_message>
<xml_diff>
--- a/snippets/migrate-third-party-to-camunda/docs/doku.pptx
+++ b/snippets/migrate-third-party-to-camunda/docs/doku.pptx
@@ -5,10 +5,10 @@
     <p:sldMasterId id="2147483648" r:id="rId1"/>
   </p:sldMasterIdLst>
   <p:notesMasterIdLst>
-    <p:notesMasterId r:id="rId8"/>
+    <p:notesMasterId r:id="rId9"/>
   </p:notesMasterIdLst>
   <p:handoutMasterIdLst>
-    <p:handoutMasterId r:id="rId9"/>
+    <p:handoutMasterId r:id="rId10"/>
   </p:handoutMasterIdLst>
   <p:sldIdLst>
     <p:sldId id="256" r:id="rId2"/>
@@ -17,11 +17,12 @@
     <p:sldId id="287" r:id="rId5"/>
     <p:sldId id="288" r:id="rId6"/>
     <p:sldId id="291" r:id="rId7"/>
+    <p:sldId id="292" r:id="rId8"/>
   </p:sldIdLst>
   <p:sldSz cx="9144000" cy="6858000" type="screen4x3"/>
   <p:notesSz cx="6858000" cy="9144000"/>
   <p:custDataLst>
-    <p:tags r:id="rId10"/>
+    <p:tags r:id="rId11"/>
   </p:custDataLst>
   <p:defaultTextStyle>
     <a:defPPr>
@@ -1090,7 +1091,7 @@
           <a:graphicData uri="http://schemas.openxmlformats.org/presentationml/2006/ole">
             <mc:AlternateContent xmlns:mc="http://schemas.openxmlformats.org/markup-compatibility/2006">
               <mc:Choice xmlns:v="urn:schemas-microsoft-com:vml" Requires="v">
-                <p:oleObj spid="_x0000_s1034" name="think-cell Slide" r:id="rId8" imgW="0" imgH="0" progId="TCLayout.ActiveDocument.1">
+                <p:oleObj spid="_x0000_s1036" name="think-cell Slide" r:id="rId8" imgW="0" imgH="0" progId="TCLayout.ActiveDocument.1">
                   <p:embed/>
                 </p:oleObj>
               </mc:Choice>
@@ -1355,7 +1356,7 @@
           <a:graphicData uri="http://schemas.openxmlformats.org/presentationml/2006/ole">
             <mc:AlternateContent xmlns:mc="http://schemas.openxmlformats.org/markup-compatibility/2006">
               <mc:Choice xmlns:v="urn:schemas-microsoft-com:vml" Requires="v">
-                <p:oleObj spid="_x0000_s8201" name="think-cell Slide" r:id="rId5" imgW="0" imgH="0" progId="TCLayout.ActiveDocument.1">
+                <p:oleObj spid="_x0000_s8203" name="think-cell Slide" r:id="rId5" imgW="0" imgH="0" progId="TCLayout.ActiveDocument.1">
                   <p:embed/>
                 </p:oleObj>
               </mc:Choice>
@@ -1665,7 +1666,7 @@
           <a:graphicData uri="http://schemas.openxmlformats.org/presentationml/2006/ole">
             <mc:AlternateContent xmlns:mc="http://schemas.openxmlformats.org/markup-compatibility/2006">
               <mc:Choice xmlns:v="urn:schemas-microsoft-com:vml" Requires="v">
-                <p:oleObj spid="_x0000_s136202" name="think-cell Slide" r:id="rId6" imgW="0" imgH="0" progId="TCLayout.ActiveDocument.1">
+                <p:oleObj spid="_x0000_s136204" name="think-cell Slide" r:id="rId6" imgW="0" imgH="0" progId="TCLayout.ActiveDocument.1">
                   <p:embed/>
                 </p:oleObj>
               </mc:Choice>
@@ -2012,7 +2013,7 @@
           <a:graphicData uri="http://schemas.openxmlformats.org/presentationml/2006/ole">
             <mc:AlternateContent xmlns:mc="http://schemas.openxmlformats.org/markup-compatibility/2006">
               <mc:Choice xmlns:v="urn:schemas-microsoft-com:vml" Requires="v">
-                <p:oleObj spid="_x0000_s108554" name="think-cell Slide" r:id="rId4" imgW="0" imgH="0" progId="TCLayout.ActiveDocument.1">
+                <p:oleObj spid="_x0000_s108556" name="think-cell Slide" r:id="rId4" imgW="0" imgH="0" progId="TCLayout.ActiveDocument.1">
                   <p:embed/>
                 </p:oleObj>
               </mc:Choice>
@@ -2215,7 +2216,7 @@
           <a:graphicData uri="http://schemas.openxmlformats.org/presentationml/2006/ole">
             <mc:AlternateContent xmlns:mc="http://schemas.openxmlformats.org/markup-compatibility/2006">
               <mc:Choice xmlns:v="urn:schemas-microsoft-com:vml" Requires="v">
-                <p:oleObj spid="_x0000_s114698" name="think-cell Slide" r:id="rId4" imgW="0" imgH="0" progId="TCLayout.ActiveDocument.1">
+                <p:oleObj spid="_x0000_s114700" name="think-cell Slide" r:id="rId4" imgW="0" imgH="0" progId="TCLayout.ActiveDocument.1">
                   <p:embed/>
                 </p:oleObj>
               </mc:Choice>
@@ -2418,7 +2419,7 @@
           <a:graphicData uri="http://schemas.openxmlformats.org/presentationml/2006/ole">
             <mc:AlternateContent xmlns:mc="http://schemas.openxmlformats.org/markup-compatibility/2006">
               <mc:Choice xmlns:v="urn:schemas-microsoft-com:vml" Requires="v">
-                <p:oleObj spid="_x0000_s107530" name="think-cell Slide" r:id="rId4" imgW="0" imgH="0" progId="TCLayout.ActiveDocument.1">
+                <p:oleObj spid="_x0000_s107532" name="think-cell Slide" r:id="rId4" imgW="0" imgH="0" progId="TCLayout.ActiveDocument.1">
                   <p:embed/>
                 </p:oleObj>
               </mc:Choice>
@@ -2539,7 +2540,7 @@
           <a:graphicData uri="http://schemas.openxmlformats.org/presentationml/2006/ole">
             <mc:AlternateContent xmlns:mc="http://schemas.openxmlformats.org/markup-compatibility/2006">
               <mc:Choice xmlns:v="urn:schemas-microsoft-com:vml" Requires="v">
-                <p:oleObj spid="_x0000_s115722" name="think-cell Slide" r:id="rId4" imgW="0" imgH="0" progId="TCLayout.ActiveDocument.1">
+                <p:oleObj spid="_x0000_s115724" name="think-cell Slide" r:id="rId4" imgW="0" imgH="0" progId="TCLayout.ActiveDocument.1">
                   <p:embed/>
                 </p:oleObj>
               </mc:Choice>
@@ -2750,7 +2751,7 @@
           <a:graphicData uri="http://schemas.openxmlformats.org/presentationml/2006/ole">
             <mc:AlternateContent xmlns:mc="http://schemas.openxmlformats.org/markup-compatibility/2006">
               <mc:Choice xmlns:v="urn:schemas-microsoft-com:vml" Requires="v">
-                <p:oleObj spid="_x0000_s137226" name="think-cell Slide" r:id="rId4" imgW="0" imgH="0" progId="TCLayout.ActiveDocument.1">
+                <p:oleObj spid="_x0000_s137228" name="think-cell Slide" r:id="rId4" imgW="0" imgH="0" progId="TCLayout.ActiveDocument.1">
                   <p:embed/>
                 </p:oleObj>
               </mc:Choice>
@@ -2910,7 +2911,7 @@
           <a:graphicData uri="http://schemas.openxmlformats.org/presentationml/2006/ole">
             <mc:AlternateContent xmlns:mc="http://schemas.openxmlformats.org/markup-compatibility/2006">
               <mc:Choice xmlns:v="urn:schemas-microsoft-com:vml" Requires="v">
-                <p:oleObj spid="_x0000_s116746" name="think-cell Slide" r:id="rId18" imgW="0" imgH="0" progId="TCLayout.ActiveDocument.1">
+                <p:oleObj spid="_x0000_s116748" name="think-cell Slide" r:id="rId18" imgW="0" imgH="0" progId="TCLayout.ActiveDocument.1">
                   <p:embed/>
                 </p:oleObj>
               </mc:Choice>
@@ -4079,7 +4080,7 @@
           <a:graphicData uri="http://schemas.openxmlformats.org/presentationml/2006/ole">
             <mc:AlternateContent xmlns:mc="http://schemas.openxmlformats.org/markup-compatibility/2006">
               <mc:Choice xmlns:v="urn:schemas-microsoft-com:vml" Requires="v">
-                <p:oleObj spid="_x0000_s2057" name="think-cell Slide" r:id="rId16" imgW="0" imgH="0" progId="TCLayout.ActiveDocument.1">
+                <p:oleObj spid="_x0000_s2059" name="think-cell Slide" r:id="rId16" imgW="0" imgH="0" progId="TCLayout.ActiveDocument.1">
                   <p:embed/>
                 </p:oleObj>
               </mc:Choice>
@@ -4458,7 +4459,7 @@
           <a:graphicData uri="http://schemas.openxmlformats.org/presentationml/2006/ole">
             <mc:AlternateContent xmlns:mc="http://schemas.openxmlformats.org/markup-compatibility/2006">
               <mc:Choice xmlns:v="urn:schemas-microsoft-com:vml" Requires="v">
-                <p:oleObj spid="_x0000_s18441" name="think-cell Slide" r:id="rId5" imgW="0" imgH="0" progId="TCLayout.ActiveDocument.1">
+                <p:oleObj spid="_x0000_s18443" name="think-cell Slide" r:id="rId5" imgW="0" imgH="0" progId="TCLayout.ActiveDocument.1">
                   <p:embed/>
                 </p:oleObj>
               </mc:Choice>
@@ -9528,6 +9529,423 @@
     <p:extLst>
       <p:ext uri="{BB962C8B-B14F-4D97-AF65-F5344CB8AC3E}">
         <p14:creationId xmlns:p14="http://schemas.microsoft.com/office/powerpoint/2010/main" val="3143721590"/>
+      </p:ext>
+    </p:extLst>
+  </p:cSld>
+  <p:clrMapOvr>
+    <a:masterClrMapping/>
+  </p:clrMapOvr>
+  <p:transition/>
+  <p:timing>
+    <p:tnLst>
+      <p:par>
+        <p:cTn id="1" dur="indefinite" restart="never" nodeType="tmRoot"/>
+      </p:par>
+    </p:tnLst>
+  </p:timing>
+</p:sld>
+</file>
+
+<file path=ppt/slides/slide7.xml><?xml version="1.0" encoding="utf-8"?>
+<p:sld xmlns:a="http://schemas.openxmlformats.org/drawingml/2006/main" xmlns:r="http://schemas.openxmlformats.org/officeDocument/2006/relationships" xmlns:p="http://schemas.openxmlformats.org/presentationml/2006/main">
+  <p:cSld>
+    <p:spTree>
+      <p:nvGrpSpPr>
+        <p:cNvPr id="1" name=""/>
+        <p:cNvGrpSpPr/>
+        <p:nvPr/>
+      </p:nvGrpSpPr>
+      <p:grpSpPr>
+        <a:xfrm>
+          <a:off x="0" y="0"/>
+          <a:ext cx="0" cy="0"/>
+          <a:chOff x="0" y="0"/>
+          <a:chExt cx="0" cy="0"/>
+        </a:xfrm>
+      </p:grpSpPr>
+      <p:sp>
+        <p:nvSpPr>
+          <p:cNvPr id="2" name="Textplatzhalter 1"/>
+          <p:cNvSpPr>
+            <a:spLocks noGrp="1"/>
+          </p:cNvSpPr>
+          <p:nvPr>
+            <p:ph type="body" sz="quarter" idx="10"/>
+          </p:nvPr>
+        </p:nvSpPr>
+        <p:spPr/>
+        <p:txBody>
+          <a:bodyPr/>
+          <a:lstStyle/>
+          <a:p>
+            <a:endParaRPr lang="de-DE"/>
+          </a:p>
+        </p:txBody>
+      </p:sp>
+      <p:pic>
+        <p:nvPicPr>
+          <p:cNvPr id="3" name="Grafik 2"/>
+          <p:cNvPicPr>
+            <a:picLocks noChangeAspect="1"/>
+          </p:cNvPicPr>
+          <p:nvPr/>
+        </p:nvPicPr>
+        <p:blipFill>
+          <a:blip r:embed="rId2"/>
+          <a:stretch>
+            <a:fillRect/>
+          </a:stretch>
+        </p:blipFill>
+        <p:spPr>
+          <a:xfrm>
+            <a:off x="2195736" y="836712"/>
+            <a:ext cx="6573395" cy="2789770"/>
+          </a:xfrm>
+          <a:prstGeom prst="rect">
+            <a:avLst/>
+          </a:prstGeom>
+        </p:spPr>
+      </p:pic>
+      <p:sp>
+        <p:nvSpPr>
+          <p:cNvPr id="4" name="Rechteck 3"/>
+          <p:cNvSpPr/>
+          <p:nvPr/>
+        </p:nvSpPr>
+        <p:spPr bwMode="auto">
+          <a:xfrm>
+            <a:off x="4499992" y="2532536"/>
+            <a:ext cx="720080" cy="968472"/>
+          </a:xfrm>
+          <a:prstGeom prst="rect">
+            <a:avLst/>
+          </a:prstGeom>
+          <a:solidFill>
+            <a:schemeClr val="accent1">
+              <a:alpha val="23000"/>
+            </a:schemeClr>
+          </a:solidFill>
+          <a:ln w="9525" cap="flat" cmpd="sng" algn="ctr">
+            <a:noFill/>
+            <a:prstDash val="solid"/>
+            <a:round/>
+            <a:headEnd type="none" w="med" len="med"/>
+            <a:tailEnd type="none" w="med" len="med"/>
+          </a:ln>
+          <a:effectLst/>
+        </p:spPr>
+        <p:txBody>
+          <a:bodyPr vert="horz" wrap="square" lIns="72000" tIns="46800" rIns="72000" bIns="46800" numCol="1" rtlCol="0" anchor="ctr" anchorCtr="0" compatLnSpc="1">
+            <a:prstTxWarp prst="textNoShape">
+              <a:avLst/>
+            </a:prstTxWarp>
+          </a:bodyPr>
+          <a:lstStyle/>
+          <a:p>
+            <a:pPr marL="0" marR="0" indent="0" algn="l" defTabSz="914400" rtl="0" eaLnBrk="1" fontAlgn="base" latinLnBrk="0" hangingPunct="1">
+              <a:lnSpc>
+                <a:spcPct val="90000"/>
+              </a:lnSpc>
+              <a:spcBef>
+                <a:spcPct val="0"/>
+              </a:spcBef>
+              <a:spcAft>
+                <a:spcPct val="0"/>
+              </a:spcAft>
+              <a:buClrTx/>
+              <a:buSzTx/>
+              <a:buFontTx/>
+              <a:buNone/>
+              <a:tabLst/>
+            </a:pPr>
+            <a:endParaRPr kumimoji="0" lang="de-DE" sz="1400" b="0" i="0" u="none" strike="noStrike" cap="none" normalizeH="0" baseline="0" dirty="0" err="1" smtClean="0">
+              <a:ln>
+                <a:noFill/>
+              </a:ln>
+              <a:solidFill>
+                <a:schemeClr val="tx1"/>
+              </a:solidFill>
+              <a:effectLst/>
+              <a:latin typeface="+mn-lt"/>
+            </a:endParaRPr>
+          </a:p>
+        </p:txBody>
+      </p:sp>
+      <p:sp>
+        <p:nvSpPr>
+          <p:cNvPr id="5" name="Rechteck 4"/>
+          <p:cNvSpPr/>
+          <p:nvPr/>
+        </p:nvSpPr>
+        <p:spPr bwMode="auto">
+          <a:xfrm>
+            <a:off x="6948264" y="2780928"/>
+            <a:ext cx="720080" cy="648072"/>
+          </a:xfrm>
+          <a:prstGeom prst="rect">
+            <a:avLst/>
+          </a:prstGeom>
+          <a:solidFill>
+            <a:schemeClr val="accent1">
+              <a:alpha val="23000"/>
+            </a:schemeClr>
+          </a:solidFill>
+          <a:ln w="9525" cap="flat" cmpd="sng" algn="ctr">
+            <a:noFill/>
+            <a:prstDash val="solid"/>
+            <a:round/>
+            <a:headEnd type="none" w="med" len="med"/>
+            <a:tailEnd type="none" w="med" len="med"/>
+          </a:ln>
+          <a:effectLst/>
+        </p:spPr>
+        <p:txBody>
+          <a:bodyPr vert="horz" wrap="square" lIns="72000" tIns="46800" rIns="72000" bIns="46800" numCol="1" rtlCol="0" anchor="ctr" anchorCtr="0" compatLnSpc="1">
+            <a:prstTxWarp prst="textNoShape">
+              <a:avLst/>
+            </a:prstTxWarp>
+          </a:bodyPr>
+          <a:lstStyle/>
+          <a:p>
+            <a:pPr marL="0" marR="0" indent="0" algn="l" defTabSz="914400" rtl="0" eaLnBrk="1" fontAlgn="base" latinLnBrk="0" hangingPunct="1">
+              <a:lnSpc>
+                <a:spcPct val="90000"/>
+              </a:lnSpc>
+              <a:spcBef>
+                <a:spcPct val="0"/>
+              </a:spcBef>
+              <a:spcAft>
+                <a:spcPct val="0"/>
+              </a:spcAft>
+              <a:buClrTx/>
+              <a:buSzTx/>
+              <a:buFontTx/>
+              <a:buNone/>
+              <a:tabLst/>
+            </a:pPr>
+            <a:endParaRPr kumimoji="0" lang="de-DE" sz="1400" b="0" i="0" u="none" strike="noStrike" cap="none" normalizeH="0" baseline="0" dirty="0" err="1" smtClean="0">
+              <a:ln>
+                <a:noFill/>
+              </a:ln>
+              <a:solidFill>
+                <a:schemeClr val="tx1"/>
+              </a:solidFill>
+              <a:effectLst/>
+              <a:latin typeface="+mn-lt"/>
+            </a:endParaRPr>
+          </a:p>
+        </p:txBody>
+      </p:sp>
+      <p:grpSp>
+        <p:nvGrpSpPr>
+          <p:cNvPr id="8" name="Gruppieren 7"/>
+          <p:cNvGrpSpPr/>
+          <p:nvPr/>
+        </p:nvGrpSpPr>
+        <p:grpSpPr>
+          <a:xfrm>
+            <a:off x="827584" y="4106006"/>
+            <a:ext cx="1872208" cy="2247692"/>
+            <a:chOff x="827584" y="4106006"/>
+            <a:chExt cx="1872208" cy="2247692"/>
+          </a:xfrm>
+        </p:grpSpPr>
+        <p:pic>
+          <p:nvPicPr>
+            <p:cNvPr id="6" name="Grafik 5"/>
+            <p:cNvPicPr>
+              <a:picLocks noChangeAspect="1"/>
+            </p:cNvPicPr>
+            <p:nvPr/>
+          </p:nvPicPr>
+          <p:blipFill rotWithShape="1">
+            <a:blip r:embed="rId2"/>
+            <a:srcRect l="69328" t="12443" r="2191" b="7541"/>
+            <a:stretch/>
+          </p:blipFill>
+          <p:spPr>
+            <a:xfrm>
+              <a:off x="827584" y="4106006"/>
+              <a:ext cx="1872208" cy="2232249"/>
+            </a:xfrm>
+            <a:prstGeom prst="rect">
+              <a:avLst/>
+            </a:prstGeom>
+          </p:spPr>
+        </p:pic>
+        <p:sp>
+          <p:nvSpPr>
+            <p:cNvPr id="7" name="Rechteck 6"/>
+            <p:cNvSpPr/>
+            <p:nvPr/>
+          </p:nvSpPr>
+          <p:spPr bwMode="auto">
+            <a:xfrm>
+              <a:off x="1017937" y="5705626"/>
+              <a:ext cx="720080" cy="648072"/>
+            </a:xfrm>
+            <a:prstGeom prst="rect">
+              <a:avLst/>
+            </a:prstGeom>
+            <a:solidFill>
+              <a:schemeClr val="accent1">
+                <a:alpha val="23000"/>
+              </a:schemeClr>
+            </a:solidFill>
+            <a:ln w="9525" cap="flat" cmpd="sng" algn="ctr">
+              <a:noFill/>
+              <a:prstDash val="solid"/>
+              <a:round/>
+              <a:headEnd type="none" w="med" len="med"/>
+              <a:tailEnd type="none" w="med" len="med"/>
+            </a:ln>
+            <a:effectLst/>
+          </p:spPr>
+          <p:txBody>
+            <a:bodyPr vert="horz" wrap="square" lIns="72000" tIns="46800" rIns="72000" bIns="46800" numCol="1" rtlCol="0" anchor="ctr" anchorCtr="0" compatLnSpc="1">
+              <a:prstTxWarp prst="textNoShape">
+                <a:avLst/>
+              </a:prstTxWarp>
+            </a:bodyPr>
+            <a:lstStyle/>
+            <a:p>
+              <a:pPr marL="0" marR="0" indent="0" algn="l" defTabSz="914400" rtl="0" eaLnBrk="1" fontAlgn="base" latinLnBrk="0" hangingPunct="1">
+                <a:lnSpc>
+                  <a:spcPct val="90000"/>
+                </a:lnSpc>
+                <a:spcBef>
+                  <a:spcPct val="0"/>
+                </a:spcBef>
+                <a:spcAft>
+                  <a:spcPct val="0"/>
+                </a:spcAft>
+                <a:buClrTx/>
+                <a:buSzTx/>
+                <a:buFontTx/>
+                <a:buNone/>
+                <a:tabLst/>
+              </a:pPr>
+              <a:endParaRPr kumimoji="0" lang="de-DE" sz="1400" b="0" i="0" u="none" strike="noStrike" cap="none" normalizeH="0" baseline="0" dirty="0" err="1" smtClean="0">
+                <a:ln>
+                  <a:noFill/>
+                </a:ln>
+                <a:solidFill>
+                  <a:schemeClr val="tx1"/>
+                </a:solidFill>
+                <a:effectLst/>
+                <a:latin typeface="+mn-lt"/>
+              </a:endParaRPr>
+            </a:p>
+          </p:txBody>
+        </p:sp>
+      </p:grpSp>
+      <p:grpSp>
+        <p:nvGrpSpPr>
+          <p:cNvPr id="11" name="Gruppieren 10"/>
+          <p:cNvGrpSpPr/>
+          <p:nvPr/>
+        </p:nvGrpSpPr>
+        <p:grpSpPr>
+          <a:xfrm>
+            <a:off x="3527884" y="4581128"/>
+            <a:ext cx="2664296" cy="1944216"/>
+            <a:chOff x="3527884" y="4581128"/>
+            <a:chExt cx="2664296" cy="1944216"/>
+          </a:xfrm>
+        </p:grpSpPr>
+        <p:pic>
+          <p:nvPicPr>
+            <p:cNvPr id="9" name="Grafik 8"/>
+            <p:cNvPicPr>
+              <a:picLocks noChangeAspect="1"/>
+            </p:cNvPicPr>
+            <p:nvPr/>
+          </p:nvPicPr>
+          <p:blipFill rotWithShape="1">
+            <a:blip r:embed="rId2"/>
+            <a:srcRect l="19718" t="26286" r="39751" b="4023"/>
+            <a:stretch/>
+          </p:blipFill>
+          <p:spPr>
+            <a:xfrm>
+              <a:off x="3527884" y="4581128"/>
+              <a:ext cx="2664296" cy="1944216"/>
+            </a:xfrm>
+            <a:prstGeom prst="rect">
+              <a:avLst/>
+            </a:prstGeom>
+          </p:spPr>
+        </p:pic>
+        <p:sp>
+          <p:nvSpPr>
+            <p:cNvPr id="10" name="Rechteck 9"/>
+            <p:cNvSpPr/>
+            <p:nvPr/>
+          </p:nvSpPr>
+          <p:spPr bwMode="auto">
+            <a:xfrm>
+              <a:off x="4499992" y="5553236"/>
+              <a:ext cx="864096" cy="972108"/>
+            </a:xfrm>
+            <a:prstGeom prst="rect">
+              <a:avLst/>
+            </a:prstGeom>
+            <a:solidFill>
+              <a:schemeClr val="accent1">
+                <a:alpha val="23000"/>
+              </a:schemeClr>
+            </a:solidFill>
+            <a:ln w="9525" cap="flat" cmpd="sng" algn="ctr">
+              <a:noFill/>
+              <a:prstDash val="solid"/>
+              <a:round/>
+              <a:headEnd type="none" w="med" len="med"/>
+              <a:tailEnd type="none" w="med" len="med"/>
+            </a:ln>
+            <a:effectLst/>
+          </p:spPr>
+          <p:txBody>
+            <a:bodyPr vert="horz" wrap="square" lIns="72000" tIns="46800" rIns="72000" bIns="46800" numCol="1" rtlCol="0" anchor="ctr" anchorCtr="0" compatLnSpc="1">
+              <a:prstTxWarp prst="textNoShape">
+                <a:avLst/>
+              </a:prstTxWarp>
+            </a:bodyPr>
+            <a:lstStyle/>
+            <a:p>
+              <a:pPr marL="0" marR="0" indent="0" algn="l" defTabSz="914400" rtl="0" eaLnBrk="1" fontAlgn="base" latinLnBrk="0" hangingPunct="1">
+                <a:lnSpc>
+                  <a:spcPct val="90000"/>
+                </a:lnSpc>
+                <a:spcBef>
+                  <a:spcPct val="0"/>
+                </a:spcBef>
+                <a:spcAft>
+                  <a:spcPct val="0"/>
+                </a:spcAft>
+                <a:buClrTx/>
+                <a:buSzTx/>
+                <a:buFontTx/>
+                <a:buNone/>
+                <a:tabLst/>
+              </a:pPr>
+              <a:endParaRPr kumimoji="0" lang="de-DE" sz="1400" b="0" i="0" u="none" strike="noStrike" cap="none" normalizeH="0" baseline="0" dirty="0" err="1" smtClean="0">
+                <a:ln>
+                  <a:noFill/>
+                </a:ln>
+                <a:solidFill>
+                  <a:schemeClr val="tx1"/>
+                </a:solidFill>
+                <a:effectLst/>
+                <a:latin typeface="+mn-lt"/>
+              </a:endParaRPr>
+            </a:p>
+          </p:txBody>
+        </p:sp>
+      </p:grpSp>
+    </p:spTree>
+    <p:extLst>
+      <p:ext uri="{BB962C8B-B14F-4D97-AF65-F5344CB8AC3E}">
+        <p14:creationId xmlns:p14="http://schemas.microsoft.com/office/powerpoint/2010/main" val="1629154085"/>
       </p:ext>
     </p:extLst>
   </p:cSld>

</xml_diff>

<commit_message>
added simple version of incident management example
</commit_message>
<xml_diff>
--- a/snippets/migrate-third-party-to-camunda/docs/doku.pptx
+++ b/snippets/migrate-third-party-to-camunda/docs/doku.pptx
@@ -285,7 +285,7 @@
             <a:fld id="{80F06307-6088-4DFD-BB97-31C1E3C8F94D}" type="datetimeFigureOut">
               <a:rPr lang="en-US" smtClean="0"/>
               <a:pPr/>
-              <a:t>7/30/2014</a:t>
+              <a:t>7/31/2014</a:t>
             </a:fld>
             <a:endParaRPr lang="de-DE"/>
           </a:p>
@@ -456,7 +456,7 @@
             <a:fld id="{56E7BBA9-3E9F-478E-BBF6-AD90C451F165}" type="datetimeFigureOut">
               <a:rPr lang="en-GB" smtClean="0"/>
               <a:pPr/>
-              <a:t>30/07/2014</a:t>
+              <a:t>31/07/2014</a:t>
             </a:fld>
             <a:endParaRPr lang="en-GB"/>
           </a:p>
@@ -1091,7 +1091,7 @@
           <a:graphicData uri="http://schemas.openxmlformats.org/presentationml/2006/ole">
             <mc:AlternateContent xmlns:mc="http://schemas.openxmlformats.org/markup-compatibility/2006">
               <mc:Choice xmlns:v="urn:schemas-microsoft-com:vml" Requires="v">
-                <p:oleObj spid="_x0000_s1036" name="think-cell Slide" r:id="rId8" imgW="0" imgH="0" progId="TCLayout.ActiveDocument.1">
+                <p:oleObj spid="_x0000_s1039" name="think-cell Slide" r:id="rId8" imgW="0" imgH="0" progId="TCLayout.ActiveDocument.1">
                   <p:embed/>
                 </p:oleObj>
               </mc:Choice>
@@ -1356,7 +1356,7 @@
           <a:graphicData uri="http://schemas.openxmlformats.org/presentationml/2006/ole">
             <mc:AlternateContent xmlns:mc="http://schemas.openxmlformats.org/markup-compatibility/2006">
               <mc:Choice xmlns:v="urn:schemas-microsoft-com:vml" Requires="v">
-                <p:oleObj spid="_x0000_s8203" name="think-cell Slide" r:id="rId5" imgW="0" imgH="0" progId="TCLayout.ActiveDocument.1">
+                <p:oleObj spid="_x0000_s8206" name="think-cell Slide" r:id="rId5" imgW="0" imgH="0" progId="TCLayout.ActiveDocument.1">
                   <p:embed/>
                 </p:oleObj>
               </mc:Choice>
@@ -1666,7 +1666,7 @@
           <a:graphicData uri="http://schemas.openxmlformats.org/presentationml/2006/ole">
             <mc:AlternateContent xmlns:mc="http://schemas.openxmlformats.org/markup-compatibility/2006">
               <mc:Choice xmlns:v="urn:schemas-microsoft-com:vml" Requires="v">
-                <p:oleObj spid="_x0000_s136204" name="think-cell Slide" r:id="rId6" imgW="0" imgH="0" progId="TCLayout.ActiveDocument.1">
+                <p:oleObj spid="_x0000_s136207" name="think-cell Slide" r:id="rId6" imgW="0" imgH="0" progId="TCLayout.ActiveDocument.1">
                   <p:embed/>
                 </p:oleObj>
               </mc:Choice>
@@ -2013,7 +2013,7 @@
           <a:graphicData uri="http://schemas.openxmlformats.org/presentationml/2006/ole">
             <mc:AlternateContent xmlns:mc="http://schemas.openxmlformats.org/markup-compatibility/2006">
               <mc:Choice xmlns:v="urn:schemas-microsoft-com:vml" Requires="v">
-                <p:oleObj spid="_x0000_s108556" name="think-cell Slide" r:id="rId4" imgW="0" imgH="0" progId="TCLayout.ActiveDocument.1">
+                <p:oleObj spid="_x0000_s108559" name="think-cell Slide" r:id="rId4" imgW="0" imgH="0" progId="TCLayout.ActiveDocument.1">
                   <p:embed/>
                 </p:oleObj>
               </mc:Choice>
@@ -2216,7 +2216,7 @@
           <a:graphicData uri="http://schemas.openxmlformats.org/presentationml/2006/ole">
             <mc:AlternateContent xmlns:mc="http://schemas.openxmlformats.org/markup-compatibility/2006">
               <mc:Choice xmlns:v="urn:schemas-microsoft-com:vml" Requires="v">
-                <p:oleObj spid="_x0000_s114700" name="think-cell Slide" r:id="rId4" imgW="0" imgH="0" progId="TCLayout.ActiveDocument.1">
+                <p:oleObj spid="_x0000_s114703" name="think-cell Slide" r:id="rId4" imgW="0" imgH="0" progId="TCLayout.ActiveDocument.1">
                   <p:embed/>
                 </p:oleObj>
               </mc:Choice>
@@ -2419,7 +2419,7 @@
           <a:graphicData uri="http://schemas.openxmlformats.org/presentationml/2006/ole">
             <mc:AlternateContent xmlns:mc="http://schemas.openxmlformats.org/markup-compatibility/2006">
               <mc:Choice xmlns:v="urn:schemas-microsoft-com:vml" Requires="v">
-                <p:oleObj spid="_x0000_s107532" name="think-cell Slide" r:id="rId4" imgW="0" imgH="0" progId="TCLayout.ActiveDocument.1">
+                <p:oleObj spid="_x0000_s107535" name="think-cell Slide" r:id="rId4" imgW="0" imgH="0" progId="TCLayout.ActiveDocument.1">
                   <p:embed/>
                 </p:oleObj>
               </mc:Choice>
@@ -2540,7 +2540,7 @@
           <a:graphicData uri="http://schemas.openxmlformats.org/presentationml/2006/ole">
             <mc:AlternateContent xmlns:mc="http://schemas.openxmlformats.org/markup-compatibility/2006">
               <mc:Choice xmlns:v="urn:schemas-microsoft-com:vml" Requires="v">
-                <p:oleObj spid="_x0000_s115724" name="think-cell Slide" r:id="rId4" imgW="0" imgH="0" progId="TCLayout.ActiveDocument.1">
+                <p:oleObj spid="_x0000_s115727" name="think-cell Slide" r:id="rId4" imgW="0" imgH="0" progId="TCLayout.ActiveDocument.1">
                   <p:embed/>
                 </p:oleObj>
               </mc:Choice>
@@ -2751,7 +2751,7 @@
           <a:graphicData uri="http://schemas.openxmlformats.org/presentationml/2006/ole">
             <mc:AlternateContent xmlns:mc="http://schemas.openxmlformats.org/markup-compatibility/2006">
               <mc:Choice xmlns:v="urn:schemas-microsoft-com:vml" Requires="v">
-                <p:oleObj spid="_x0000_s137228" name="think-cell Slide" r:id="rId4" imgW="0" imgH="0" progId="TCLayout.ActiveDocument.1">
+                <p:oleObj spid="_x0000_s137231" name="think-cell Slide" r:id="rId4" imgW="0" imgH="0" progId="TCLayout.ActiveDocument.1">
                   <p:embed/>
                 </p:oleObj>
               </mc:Choice>
@@ -2911,7 +2911,7 @@
           <a:graphicData uri="http://schemas.openxmlformats.org/presentationml/2006/ole">
             <mc:AlternateContent xmlns:mc="http://schemas.openxmlformats.org/markup-compatibility/2006">
               <mc:Choice xmlns:v="urn:schemas-microsoft-com:vml" Requires="v">
-                <p:oleObj spid="_x0000_s116748" name="think-cell Slide" r:id="rId18" imgW="0" imgH="0" progId="TCLayout.ActiveDocument.1">
+                <p:oleObj spid="_x0000_s116751" name="think-cell Slide" r:id="rId18" imgW="0" imgH="0" progId="TCLayout.ActiveDocument.1">
                   <p:embed/>
                 </p:oleObj>
               </mc:Choice>
@@ -4080,7 +4080,7 @@
           <a:graphicData uri="http://schemas.openxmlformats.org/presentationml/2006/ole">
             <mc:AlternateContent xmlns:mc="http://schemas.openxmlformats.org/markup-compatibility/2006">
               <mc:Choice xmlns:v="urn:schemas-microsoft-com:vml" Requires="v">
-                <p:oleObj spid="_x0000_s2059" name="think-cell Slide" r:id="rId16" imgW="0" imgH="0" progId="TCLayout.ActiveDocument.1">
+                <p:oleObj spid="_x0000_s2062" name="think-cell Slide" r:id="rId16" imgW="0" imgH="0" progId="TCLayout.ActiveDocument.1">
                   <p:embed/>
                 </p:oleObj>
               </mc:Choice>
@@ -4459,7 +4459,7 @@
           <a:graphicData uri="http://schemas.openxmlformats.org/presentationml/2006/ole">
             <mc:AlternateContent xmlns:mc="http://schemas.openxmlformats.org/markup-compatibility/2006">
               <mc:Choice xmlns:v="urn:schemas-microsoft-com:vml" Requires="v">
-                <p:oleObj spid="_x0000_s18443" name="think-cell Slide" r:id="rId5" imgW="0" imgH="0" progId="TCLayout.ActiveDocument.1">
+                <p:oleObj spid="_x0000_s18446" name="think-cell Slide" r:id="rId5" imgW="0" imgH="0" progId="TCLayout.ActiveDocument.1">
                   <p:embed/>
                 </p:oleObj>
               </mc:Choice>
@@ -4951,6 +4951,30 @@
       </p:grpSpPr>
       <p:pic>
         <p:nvPicPr>
+          <p:cNvPr id="10" name="Grafik 9"/>
+          <p:cNvPicPr>
+            <a:picLocks noChangeAspect="1"/>
+          </p:cNvPicPr>
+          <p:nvPr/>
+        </p:nvPicPr>
+        <p:blipFill>
+          <a:blip r:embed="rId2"/>
+          <a:stretch>
+            <a:fillRect/>
+          </a:stretch>
+        </p:blipFill>
+        <p:spPr>
+          <a:xfrm>
+            <a:off x="2558973" y="4079930"/>
+            <a:ext cx="6585027" cy="2785525"/>
+          </a:xfrm>
+          <a:prstGeom prst="rect">
+            <a:avLst/>
+          </a:prstGeom>
+        </p:spPr>
+      </p:pic>
+      <p:pic>
+        <p:nvPicPr>
           <p:cNvPr id="4" name="Grafik 3"/>
           <p:cNvPicPr>
             <a:picLocks noChangeAspect="1"/>
@@ -4958,7 +4982,7 @@
           <p:nvPr/>
         </p:nvPicPr>
         <p:blipFill>
-          <a:blip r:embed="rId2"/>
+          <a:blip r:embed="rId3"/>
           <a:stretch>
             <a:fillRect/>
           </a:stretch>
@@ -4982,7 +5006,7 @@
           <p:nvPr/>
         </p:nvPicPr>
         <p:blipFill>
-          <a:blip r:embed="rId3"/>
+          <a:blip r:embed="rId4"/>
           <a:stretch>
             <a:fillRect/>
           </a:stretch>
@@ -4991,30 +5015,6 @@
           <a:xfrm>
             <a:off x="0" y="2060848"/>
             <a:ext cx="3819424" cy="1896542"/>
-          </a:xfrm>
-          <a:prstGeom prst="rect">
-            <a:avLst/>
-          </a:prstGeom>
-        </p:spPr>
-      </p:pic>
-      <p:pic>
-        <p:nvPicPr>
-          <p:cNvPr id="6" name="Grafik 5"/>
-          <p:cNvPicPr>
-            <a:picLocks noChangeAspect="1"/>
-          </p:cNvPicPr>
-          <p:nvPr/>
-        </p:nvPicPr>
-        <p:blipFill>
-          <a:blip r:embed="rId4"/>
-          <a:stretch>
-            <a:fillRect/>
-          </a:stretch>
-        </p:blipFill>
-        <p:spPr>
-          <a:xfrm>
-            <a:off x="2570605" y="4055654"/>
-            <a:ext cx="6573395" cy="2789770"/>
           </a:xfrm>
           <a:prstGeom prst="rect">
             <a:avLst/>
@@ -5303,6 +5303,30 @@
       </p:grpSpPr>
       <p:pic>
         <p:nvPicPr>
+          <p:cNvPr id="2" name="Grafik 1"/>
+          <p:cNvPicPr>
+            <a:picLocks noChangeAspect="1"/>
+          </p:cNvPicPr>
+          <p:nvPr/>
+        </p:nvPicPr>
+        <p:blipFill>
+          <a:blip r:embed="rId3"/>
+          <a:stretch>
+            <a:fillRect/>
+          </a:stretch>
+        </p:blipFill>
+        <p:spPr>
+          <a:xfrm>
+            <a:off x="2558973" y="4079930"/>
+            <a:ext cx="6585027" cy="2785525"/>
+          </a:xfrm>
+          <a:prstGeom prst="rect">
+            <a:avLst/>
+          </a:prstGeom>
+        </p:spPr>
+      </p:pic>
+      <p:pic>
+        <p:nvPicPr>
           <p:cNvPr id="11" name="Grafik 10"/>
           <p:cNvPicPr>
             <a:picLocks noChangeAspect="1"/>
@@ -5310,7 +5334,7 @@
           <p:nvPr/>
         </p:nvPicPr>
         <p:blipFill>
-          <a:blip r:embed="rId3"/>
+          <a:blip r:embed="rId4"/>
           <a:stretch>
             <a:fillRect/>
           </a:stretch>
@@ -5334,7 +5358,7 @@
           <p:nvPr/>
         </p:nvPicPr>
         <p:blipFill>
-          <a:blip r:embed="rId4"/>
+          <a:blip r:embed="rId5"/>
           <a:stretch>
             <a:fillRect/>
           </a:stretch>
@@ -5343,30 +5367,6 @@
           <a:xfrm>
             <a:off x="0" y="2060848"/>
             <a:ext cx="3819424" cy="1896542"/>
-          </a:xfrm>
-          <a:prstGeom prst="rect">
-            <a:avLst/>
-          </a:prstGeom>
-        </p:spPr>
-      </p:pic>
-      <p:pic>
-        <p:nvPicPr>
-          <p:cNvPr id="13" name="Grafik 12"/>
-          <p:cNvPicPr>
-            <a:picLocks noChangeAspect="1"/>
-          </p:cNvPicPr>
-          <p:nvPr/>
-        </p:nvPicPr>
-        <p:blipFill>
-          <a:blip r:embed="rId5"/>
-          <a:stretch>
-            <a:fillRect/>
-          </a:stretch>
-        </p:blipFill>
-        <p:spPr>
-          <a:xfrm>
-            <a:off x="2570605" y="4055654"/>
-            <a:ext cx="6573395" cy="2789770"/>
           </a:xfrm>
           <a:prstGeom prst="rect">
             <a:avLst/>
@@ -6809,7 +6809,7 @@
         <p:spPr bwMode="auto">
           <a:xfrm>
             <a:off x="2387129" y="3005044"/>
-            <a:ext cx="2710853" cy="2896949"/>
+            <a:ext cx="2544911" cy="3016244"/>
           </a:xfrm>
           <a:custGeom>
             <a:avLst/>
@@ -7609,8 +7609,8 @@
         </p:nvSpPr>
         <p:spPr bwMode="auto">
           <a:xfrm>
-            <a:off x="5284099" y="5712977"/>
-            <a:ext cx="623087" cy="169933"/>
+            <a:off x="5103885" y="5712977"/>
+            <a:ext cx="803302" cy="308311"/>
           </a:xfrm>
           <a:custGeom>
             <a:avLst/>
@@ -7796,7 +7796,7 @@
       </p:grpSpPr>
       <p:pic>
         <p:nvPicPr>
-          <p:cNvPr id="8" name="Grafik 7"/>
+          <p:cNvPr id="9" name="Grafik 8"/>
           <p:cNvPicPr>
             <a:picLocks noChangeAspect="1"/>
           </p:cNvPicPr>
@@ -7810,8 +7810,8 @@
         </p:blipFill>
         <p:spPr>
           <a:xfrm>
-            <a:off x="4125123" y="343903"/>
-            <a:ext cx="4680520" cy="2621091"/>
+            <a:off x="2219573" y="3356992"/>
+            <a:ext cx="6585027" cy="2785525"/>
           </a:xfrm>
           <a:prstGeom prst="rect">
             <a:avLst/>
@@ -7820,7 +7820,7 @@
       </p:pic>
       <p:pic>
         <p:nvPicPr>
-          <p:cNvPr id="12" name="Grafik 11"/>
+          <p:cNvPr id="8" name="Grafik 7"/>
           <p:cNvPicPr>
             <a:picLocks noChangeAspect="1"/>
           </p:cNvPicPr>
@@ -7834,8 +7834,8 @@
         </p:blipFill>
         <p:spPr>
           <a:xfrm>
-            <a:off x="2411760" y="3126103"/>
-            <a:ext cx="6573395" cy="2789770"/>
+            <a:off x="4125123" y="343903"/>
+            <a:ext cx="4680520" cy="2621091"/>
           </a:xfrm>
           <a:prstGeom prst="rect">
             <a:avLst/>
@@ -8209,7 +8209,7 @@
         <p:spPr bwMode="auto">
           <a:xfrm>
             <a:off x="6743661" y="1786379"/>
-            <a:ext cx="712099" cy="3393558"/>
+            <a:ext cx="564643" cy="2866757"/>
           </a:xfrm>
           <a:custGeom>
             <a:avLst/>
@@ -8851,8 +8851,8 @@
         </p:nvSpPr>
         <p:spPr bwMode="auto">
           <a:xfrm>
-            <a:off x="7560957" y="3925670"/>
-            <a:ext cx="299574" cy="1254266"/>
+            <a:off x="7452320" y="4221088"/>
+            <a:ext cx="163481" cy="432048"/>
           </a:xfrm>
           <a:custGeom>
             <a:avLst/>
@@ -9563,6 +9563,30 @@
           <a:chExt cx="0" cy="0"/>
         </a:xfrm>
       </p:grpSpPr>
+      <p:pic>
+        <p:nvPicPr>
+          <p:cNvPr id="12" name="Grafik 11"/>
+          <p:cNvPicPr>
+            <a:picLocks noChangeAspect="1"/>
+          </p:cNvPicPr>
+          <p:nvPr/>
+        </p:nvPicPr>
+        <p:blipFill>
+          <a:blip r:embed="rId2"/>
+          <a:stretch>
+            <a:fillRect/>
+          </a:stretch>
+        </p:blipFill>
+        <p:spPr>
+          <a:xfrm>
+            <a:off x="2332890" y="1139773"/>
+            <a:ext cx="6585027" cy="2785525"/>
+          </a:xfrm>
+          <a:prstGeom prst="rect">
+            <a:avLst/>
+          </a:prstGeom>
+        </p:spPr>
+      </p:pic>
       <p:sp>
         <p:nvSpPr>
           <p:cNvPr id="2" name="Textplatzhalter 1"/>
@@ -9582,30 +9606,6 @@
           </a:p>
         </p:txBody>
       </p:sp>
-      <p:pic>
-        <p:nvPicPr>
-          <p:cNvPr id="3" name="Grafik 2"/>
-          <p:cNvPicPr>
-            <a:picLocks noChangeAspect="1"/>
-          </p:cNvPicPr>
-          <p:nvPr/>
-        </p:nvPicPr>
-        <p:blipFill>
-          <a:blip r:embed="rId2"/>
-          <a:stretch>
-            <a:fillRect/>
-          </a:stretch>
-        </p:blipFill>
-        <p:spPr>
-          <a:xfrm>
-            <a:off x="2195736" y="836712"/>
-            <a:ext cx="6573395" cy="2789770"/>
-          </a:xfrm>
-          <a:prstGeom prst="rect">
-            <a:avLst/>
-          </a:prstGeom>
-        </p:spPr>
-      </p:pic>
       <p:sp>
         <p:nvSpPr>
           <p:cNvPr id="4" name="Rechteck 3"/>
@@ -9614,8 +9614,8 @@
         </p:nvSpPr>
         <p:spPr bwMode="auto">
           <a:xfrm>
-            <a:off x="4499992" y="2532536"/>
-            <a:ext cx="720080" cy="968472"/>
+            <a:off x="4388549" y="2924944"/>
+            <a:ext cx="720080" cy="576064"/>
           </a:xfrm>
           <a:prstGeom prst="rect">
             <a:avLst/>
@@ -9679,7 +9679,7 @@
         </p:nvSpPr>
         <p:spPr bwMode="auto">
           <a:xfrm>
-            <a:off x="6948264" y="2780928"/>
+            <a:off x="7164288" y="2335949"/>
             <a:ext cx="720080" cy="648072"/>
           </a:xfrm>
           <a:prstGeom prst="rect">
@@ -9759,7 +9759,7 @@
             <p:nvPr/>
           </p:nvPicPr>
           <p:blipFill rotWithShape="1">
-            <a:blip r:embed="rId2"/>
+            <a:blip r:embed="rId3"/>
             <a:srcRect l="69328" t="12443" r="2191" b="7541"/>
             <a:stretch/>
           </p:blipFill>
@@ -9841,21 +9841,21 @@
       </p:grpSp>
       <p:grpSp>
         <p:nvGrpSpPr>
-          <p:cNvPr id="11" name="Gruppieren 10"/>
+          <p:cNvPr id="14" name="Gruppieren 13"/>
           <p:cNvGrpSpPr/>
           <p:nvPr/>
         </p:nvGrpSpPr>
         <p:grpSpPr>
           <a:xfrm>
-            <a:off x="3527884" y="4581128"/>
-            <a:ext cx="2664296" cy="1944216"/>
-            <a:chOff x="3527884" y="4581128"/>
-            <a:chExt cx="2664296" cy="1944216"/>
+            <a:off x="3776481" y="4941168"/>
+            <a:ext cx="2664296" cy="1728192"/>
+            <a:chOff x="3776481" y="4941168"/>
+            <a:chExt cx="2664296" cy="1728192"/>
           </a:xfrm>
         </p:grpSpPr>
         <p:pic>
           <p:nvPicPr>
-            <p:cNvPr id="9" name="Grafik 8"/>
+            <p:cNvPr id="13" name="Grafik 12"/>
             <p:cNvPicPr>
               <a:picLocks noChangeAspect="1"/>
             </p:cNvPicPr>
@@ -9863,13 +9863,13 @@
           </p:nvPicPr>
           <p:blipFill rotWithShape="1">
             <a:blip r:embed="rId2"/>
-            <a:srcRect l="19718" t="26286" r="39751" b="4023"/>
+            <a:srcRect l="19659" t="27594" r="39881" b="10364"/>
             <a:stretch/>
           </p:blipFill>
           <p:spPr>
             <a:xfrm>
-              <a:off x="3527884" y="4581128"/>
-              <a:ext cx="2664296" cy="1944216"/>
+              <a:off x="3776481" y="4941168"/>
+              <a:ext cx="2664296" cy="1728192"/>
             </a:xfrm>
             <a:prstGeom prst="rect">
               <a:avLst/>
@@ -9884,8 +9884,8 @@
           </p:nvSpPr>
           <p:spPr bwMode="auto">
             <a:xfrm>
-              <a:off x="4499992" y="5553236"/>
-              <a:ext cx="864096" cy="972108"/>
+              <a:off x="4499992" y="5949280"/>
+              <a:ext cx="864096" cy="576064"/>
             </a:xfrm>
             <a:prstGeom prst="rect">
               <a:avLst/>

</xml_diff>